<commit_message>
Added materials for class 7
</commit_message>
<xml_diff>
--- a/Classes/Class_6/CPP_MemoryManagement.pptx
+++ b/Classes/Class_6/CPP_MemoryManagement.pptx
@@ -4900,7 +4900,7 @@
           <a:p>
             <a:fld id="{DB430043-EE85-4B6C-A802-3E6B16F216A2}" type="datetimeFigureOut">
               <a:rPr lang="en-IL" smtClean="0"/>
-              <a:t>04/12/2022</a:t>
+              <a:t>12/12/2022</a:t>
             </a:fld>
             <a:endParaRPr lang="en-IL"/>
           </a:p>
@@ -5165,7 +5165,7 @@
           <a:p>
             <a:fld id="{6B548E75-1D94-41E4-8CAC-9631837BFE23}" type="datetimeFigureOut">
               <a:rPr lang="en-IL" smtClean="0"/>
-              <a:t>04/12/2022</a:t>
+              <a:t>12/12/2022</a:t>
             </a:fld>
             <a:endParaRPr lang="en-IL"/>
           </a:p>
@@ -5432,7 +5432,7 @@
           <a:p>
             <a:fld id="{6B548E75-1D94-41E4-8CAC-9631837BFE23}" type="datetimeFigureOut">
               <a:rPr lang="en-IL" smtClean="0"/>
-              <a:t>04/12/2022</a:t>
+              <a:t>12/12/2022</a:t>
             </a:fld>
             <a:endParaRPr lang="en-IL"/>
           </a:p>
@@ -5663,7 +5663,7 @@
           <a:p>
             <a:fld id="{6B548E75-1D94-41E4-8CAC-9631837BFE23}" type="datetimeFigureOut">
               <a:rPr lang="en-IL" smtClean="0"/>
-              <a:t>04/12/2022</a:t>
+              <a:t>12/12/2022</a:t>
             </a:fld>
             <a:endParaRPr lang="en-IL"/>
           </a:p>
@@ -5973,7 +5973,7 @@
           <a:p>
             <a:fld id="{6B548E75-1D94-41E4-8CAC-9631837BFE23}" type="datetimeFigureOut">
               <a:rPr lang="en-IL" smtClean="0"/>
-              <a:t>04/12/2022</a:t>
+              <a:t>12/12/2022</a:t>
             </a:fld>
             <a:endParaRPr lang="en-IL"/>
           </a:p>
@@ -6446,7 +6446,7 @@
           <a:p>
             <a:fld id="{6B548E75-1D94-41E4-8CAC-9631837BFE23}" type="datetimeFigureOut">
               <a:rPr lang="en-IL" smtClean="0"/>
-              <a:t>04/12/2022</a:t>
+              <a:t>12/12/2022</a:t>
             </a:fld>
             <a:endParaRPr lang="en-IL"/>
           </a:p>
@@ -6993,7 +6993,7 @@
           <a:p>
             <a:fld id="{6B548E75-1D94-41E4-8CAC-9631837BFE23}" type="datetimeFigureOut">
               <a:rPr lang="en-IL" smtClean="0"/>
-              <a:t>04/12/2022</a:t>
+              <a:t>12/12/2022</a:t>
             </a:fld>
             <a:endParaRPr lang="en-IL"/>
           </a:p>
@@ -7767,7 +7767,7 @@
           <a:p>
             <a:fld id="{6B548E75-1D94-41E4-8CAC-9631837BFE23}" type="datetimeFigureOut">
               <a:rPr lang="en-IL" smtClean="0"/>
-              <a:t>04/12/2022</a:t>
+              <a:t>12/12/2022</a:t>
             </a:fld>
             <a:endParaRPr lang="en-IL"/>
           </a:p>
@@ -7942,7 +7942,7 @@
           <a:p>
             <a:fld id="{6B548E75-1D94-41E4-8CAC-9631837BFE23}" type="datetimeFigureOut">
               <a:rPr lang="en-IL" smtClean="0"/>
-              <a:t>04/12/2022</a:t>
+              <a:t>12/12/2022</a:t>
             </a:fld>
             <a:endParaRPr lang="en-IL"/>
           </a:p>
@@ -8165,7 +8165,7 @@
           <a:p>
             <a:fld id="{6B548E75-1D94-41E4-8CAC-9631837BFE23}" type="datetimeFigureOut">
               <a:rPr lang="en-IL" smtClean="0"/>
-              <a:t>04/12/2022</a:t>
+              <a:t>12/12/2022</a:t>
             </a:fld>
             <a:endParaRPr lang="en-IL"/>
           </a:p>
@@ -8345,7 +8345,7 @@
           <a:p>
             <a:fld id="{6B548E75-1D94-41E4-8CAC-9631837BFE23}" type="datetimeFigureOut">
               <a:rPr lang="en-IL" smtClean="0"/>
-              <a:t>04/12/2022</a:t>
+              <a:t>12/12/2022</a:t>
             </a:fld>
             <a:endParaRPr lang="en-IL"/>
           </a:p>
@@ -8634,7 +8634,7 @@
           <a:p>
             <a:fld id="{6B548E75-1D94-41E4-8CAC-9631837BFE23}" type="datetimeFigureOut">
               <a:rPr lang="en-IL" smtClean="0"/>
-              <a:t>04/12/2022</a:t>
+              <a:t>12/12/2022</a:t>
             </a:fld>
             <a:endParaRPr lang="en-IL"/>
           </a:p>
@@ -8876,7 +8876,7 @@
           <a:p>
             <a:fld id="{6B548E75-1D94-41E4-8CAC-9631837BFE23}" type="datetimeFigureOut">
               <a:rPr lang="en-IL" smtClean="0"/>
-              <a:t>04/12/2022</a:t>
+              <a:t>12/12/2022</a:t>
             </a:fld>
             <a:endParaRPr lang="en-IL"/>
           </a:p>
@@ -9255,7 +9255,7 @@
           <a:p>
             <a:fld id="{6B548E75-1D94-41E4-8CAC-9631837BFE23}" type="datetimeFigureOut">
               <a:rPr lang="en-IL" smtClean="0"/>
-              <a:t>04/12/2022</a:t>
+              <a:t>12/12/2022</a:t>
             </a:fld>
             <a:endParaRPr lang="en-IL"/>
           </a:p>
@@ -9373,7 +9373,7 @@
           <a:p>
             <a:fld id="{6B548E75-1D94-41E4-8CAC-9631837BFE23}" type="datetimeFigureOut">
               <a:rPr lang="en-IL" smtClean="0"/>
-              <a:t>04/12/2022</a:t>
+              <a:t>12/12/2022</a:t>
             </a:fld>
             <a:endParaRPr lang="en-IL"/>
           </a:p>
@@ -9468,7 +9468,7 @@
           <a:p>
             <a:fld id="{6B548E75-1D94-41E4-8CAC-9631837BFE23}" type="datetimeFigureOut">
               <a:rPr lang="en-IL" smtClean="0"/>
-              <a:t>04/12/2022</a:t>
+              <a:t>12/12/2022</a:t>
             </a:fld>
             <a:endParaRPr lang="en-IL"/>
           </a:p>
@@ -9717,7 +9717,7 @@
           <a:p>
             <a:fld id="{6B548E75-1D94-41E4-8CAC-9631837BFE23}" type="datetimeFigureOut">
               <a:rPr lang="en-IL" smtClean="0"/>
-              <a:t>04/12/2022</a:t>
+              <a:t>12/12/2022</a:t>
             </a:fld>
             <a:endParaRPr lang="en-IL"/>
           </a:p>
@@ -9974,7 +9974,7 @@
           <a:p>
             <a:fld id="{6B548E75-1D94-41E4-8CAC-9631837BFE23}" type="datetimeFigureOut">
               <a:rPr lang="en-IL" smtClean="0"/>
-              <a:t>04/12/2022</a:t>
+              <a:t>12/12/2022</a:t>
             </a:fld>
             <a:endParaRPr lang="en-IL"/>
           </a:p>
@@ -10040,25 +10040,9 @@
   <p:cSld>
     <p:bg>
       <p:bgPr>
-        <a:blipFill dpi="0" rotWithShape="1">
-          <a:blip r:embed="rId19">
-            <a:extLst>
-              <a:ext uri="{BEBA8EAE-BF5A-486C-A8C5-ECC9F3942E4B}">
-                <a14:imgProps xmlns:a14="http://schemas.microsoft.com/office/drawing/2010/main">
-                  <a14:imgLayer r:embed="rId20">
-                    <a14:imgEffect>
-                      <a14:brightnessContrast bright="-100000" contrast="-40000"/>
-                    </a14:imgEffect>
-                  </a14:imgLayer>
-                </a14:imgProps>
-              </a:ext>
-            </a:extLst>
-          </a:blip>
-          <a:srcRect/>
-          <a:stretch>
-            <a:fillRect/>
-          </a:stretch>
-        </a:blipFill>
+        <a:solidFill>
+          <a:schemeClr val="bg1"/>
+        </a:solidFill>
         <a:effectLst/>
       </p:bgPr>
     </p:bg>
@@ -10085,7 +10069,7 @@
           <p:nvPr/>
         </p:nvPicPr>
         <p:blipFill>
-          <a:blip r:embed="rId21">
+          <a:blip r:embed="rId19">
             <a:extLst>
               <a:ext uri="{28A0092B-C50C-407E-A947-70E740481C1C}">
                 <a14:useLocalDpi xmlns:a14="http://schemas.microsoft.com/office/drawing/2010/main" val="0"/>
@@ -10236,7 +10220,7 @@
           <a:p>
             <a:fld id="{6B548E75-1D94-41E4-8CAC-9631837BFE23}" type="datetimeFigureOut">
               <a:rPr lang="en-IL" smtClean="0"/>
-              <a:t>04/12/2022</a:t>
+              <a:t>12/12/2022</a:t>
             </a:fld>
             <a:endParaRPr lang="en-IL"/>
           </a:p>
@@ -10781,10 +10765,18 @@
           <a:lstStyle/>
           <a:p>
             <a:r>
+              <a:rPr lang="en-US" sz="5400" dirty="0"/>
+              <a:t>CPP</a:t>
+            </a:r>
+            <a:r>
+              <a:rPr lang="he-IL" sz="5400" dirty="0"/>
+              <a:t> </a:t>
+            </a:r>
+            <a:r>
               <a:rPr lang="en-US" sz="5400"/>
-              <a:t>Unreal engine advnced</a:t>
+              <a:t>Beginners</a:t>
             </a:r>
-            <a:endParaRPr lang="en-IL" sz="5400"/>
+            <a:endParaRPr lang="en-IL" sz="5400" dirty="0"/>
           </a:p>
         </p:txBody>
       </p:sp>
@@ -11592,14 +11584,6 @@
 <file path=ppt/slides/slide3.xml><?xml version="1.0" encoding="utf-8"?>
 <p:sld xmlns:a="http://schemas.openxmlformats.org/drawingml/2006/main" xmlns:r="http://schemas.openxmlformats.org/officeDocument/2006/relationships" xmlns:p="http://schemas.openxmlformats.org/presentationml/2006/main">
   <p:cSld>
-    <p:bg>
-      <p:bgPr>
-        <a:solidFill>
-          <a:schemeClr val="bg1"/>
-        </a:solidFill>
-        <a:effectLst/>
-      </p:bgPr>
-    </p:bg>
     <p:spTree>
       <p:nvGrpSpPr>
         <p:cNvPr id="1" name=""/>
@@ -11942,14 +11926,6 @@
 <file path=ppt/slides/slide4.xml><?xml version="1.0" encoding="utf-8"?>
 <p:sld xmlns:a="http://schemas.openxmlformats.org/drawingml/2006/main" xmlns:r="http://schemas.openxmlformats.org/officeDocument/2006/relationships" xmlns:p="http://schemas.openxmlformats.org/presentationml/2006/main">
   <p:cSld>
-    <p:bg>
-      <p:bgPr>
-        <a:solidFill>
-          <a:schemeClr val="bg1"/>
-        </a:solidFill>
-        <a:effectLst/>
-      </p:bgPr>
-    </p:bg>
     <p:spTree>
       <p:nvGrpSpPr>
         <p:cNvPr id="1" name=""/>
@@ -12292,14 +12268,6 @@
 <file path=ppt/slides/slide5.xml><?xml version="1.0" encoding="utf-8"?>
 <p:sld xmlns:a="http://schemas.openxmlformats.org/drawingml/2006/main" xmlns:r="http://schemas.openxmlformats.org/officeDocument/2006/relationships" xmlns:p="http://schemas.openxmlformats.org/presentationml/2006/main">
   <p:cSld>
-    <p:bg>
-      <p:bgPr>
-        <a:solidFill>
-          <a:schemeClr val="bg1"/>
-        </a:solidFill>
-        <a:effectLst/>
-      </p:bgPr>
-    </p:bg>
     <p:spTree>
       <p:nvGrpSpPr>
         <p:cNvPr id="1" name=""/>
@@ -12716,14 +12684,6 @@
 <file path=ppt/slides/slide6.xml><?xml version="1.0" encoding="utf-8"?>
 <p:sld xmlns:a="http://schemas.openxmlformats.org/drawingml/2006/main" xmlns:r="http://schemas.openxmlformats.org/officeDocument/2006/relationships" xmlns:p="http://schemas.openxmlformats.org/presentationml/2006/main">
   <p:cSld>
-    <p:bg>
-      <p:bgPr>
-        <a:solidFill>
-          <a:schemeClr val="bg1"/>
-        </a:solidFill>
-        <a:effectLst/>
-      </p:bgPr>
-    </p:bg>
     <p:spTree>
       <p:nvGrpSpPr>
         <p:cNvPr id="1" name=""/>

</xml_diff>